<commit_message>
pptx generation complete use of form complete controller complete
</commit_message>
<xml_diff>
--- a/src/main/resources/docx_templates/substitution_sample.pptx
+++ b/src/main/resources/docx_templates/substitution_sample.pptx
@@ -339,7 +339,7 @@
           <a:p>
             <a:fld id="{4BDF68E2-58F2-4D09-BE8B-E3BD06533059}" type="datetimeFigureOut">
               <a:rPr lang="en-US" dirty="0"/>
-              <a:t>12/21/16</a:t>
+              <a:t>12/28/16</a:t>
             </a:fld>
             <a:endParaRPr lang="en-US" dirty="0"/>
           </a:p>
@@ -542,7 +542,7 @@
           <a:p>
             <a:fld id="{2E2D6473-DF6D-4702-B328-E0DD40540A4E}" type="datetimeFigureOut">
               <a:rPr lang="en-US" dirty="0"/>
-              <a:t>12/21/16</a:t>
+              <a:t>12/28/16</a:t>
             </a:fld>
             <a:endParaRPr lang="en-US" dirty="0"/>
           </a:p>
@@ -793,7 +793,7 @@
           <a:p>
             <a:fld id="{E26F7E3A-B166-407D-9866-32884E7D5B37}" type="datetimeFigureOut">
               <a:rPr lang="en-US" dirty="0"/>
-              <a:t>12/21/16</a:t>
+              <a:t>12/28/16</a:t>
             </a:fld>
             <a:endParaRPr lang="en-US" dirty="0"/>
           </a:p>
@@ -962,7 +962,7 @@
           <a:p>
             <a:fld id="{528FC5F6-F338-4AE4-BB23-26385BCFC423}" type="datetimeFigureOut">
               <a:rPr lang="en-US" dirty="0"/>
-              <a:t>12/21/16</a:t>
+              <a:t>12/28/16</a:t>
             </a:fld>
             <a:endParaRPr lang="en-US" dirty="0"/>
           </a:p>
@@ -1300,7 +1300,7 @@
           <a:p>
             <a:fld id="{20EBB0C4-6273-4C6E-B9BD-2EDC30F1CD52}" type="datetimeFigureOut">
               <a:rPr lang="en-US" dirty="0"/>
-              <a:t>12/21/16</a:t>
+              <a:t>12/28/16</a:t>
             </a:fld>
             <a:endParaRPr lang="en-US" dirty="0"/>
           </a:p>
@@ -1570,7 +1570,7 @@
           <a:p>
             <a:fld id="{19AB4D41-86C1-4908-B66A-0B50CEB3BF29}" type="datetimeFigureOut">
               <a:rPr lang="en-US" dirty="0"/>
-              <a:t>12/21/16</a:t>
+              <a:t>12/28/16</a:t>
             </a:fld>
             <a:endParaRPr lang="en-US" dirty="0"/>
           </a:p>
@@ -1944,7 +1944,7 @@
           <a:p>
             <a:fld id="{E6426E2C-56C1-4E0D-A793-0088A7FDD37E}" type="datetimeFigureOut">
               <a:rPr lang="en-US" dirty="0"/>
-              <a:t>12/21/16</a:t>
+              <a:t>12/28/16</a:t>
             </a:fld>
             <a:endParaRPr lang="en-US" dirty="0"/>
           </a:p>
@@ -2057,7 +2057,7 @@
           <a:p>
             <a:fld id="{C8C39B41-D8B5-4052-B551-9B5525EAA8B6}" type="datetimeFigureOut">
               <a:rPr lang="en-US" dirty="0"/>
-              <a:t>12/21/16</a:t>
+              <a:t>12/28/16</a:t>
             </a:fld>
             <a:endParaRPr lang="en-US" dirty="0"/>
           </a:p>
@@ -2223,7 +2223,7 @@
           <a:p>
             <a:fld id="{4D94136C-8742-45B2-AF27-D93DF72833A9}" type="datetimeFigureOut">
               <a:rPr lang="en-US" dirty="0"/>
-              <a:t>12/21/16</a:t>
+              <a:t>12/28/16</a:t>
             </a:fld>
             <a:endParaRPr lang="en-US" dirty="0"/>
           </a:p>
@@ -2573,7 +2573,7 @@
           <a:p>
             <a:fld id="{32ABBEA6-7C60-4B02-AE87-00D78D8422AF}" type="datetimeFigureOut">
               <a:rPr lang="en-US" dirty="0"/>
-              <a:t>12/21/16</a:t>
+              <a:t>12/28/16</a:t>
             </a:fld>
             <a:endParaRPr lang="en-US" dirty="0"/>
           </a:p>
@@ -2951,7 +2951,7 @@
           <a:p>
             <a:fld id="{C9CAD897-D46E-4AD2-BD9B-49DD3E640873}" type="datetimeFigureOut">
               <a:rPr lang="en-US" dirty="0"/>
-              <a:t>12/21/16</a:t>
+              <a:t>12/28/16</a:t>
             </a:fld>
             <a:endParaRPr lang="en-US" dirty="0"/>
           </a:p>
@@ -3233,7 +3233,7 @@
           <a:p>
             <a:fld id="{98624D31-43A5-475A-80CF-332C9F6DCF35}" type="datetimeFigureOut">
               <a:rPr lang="en-US" dirty="0"/>
-              <a:t>12/21/16</a:t>
+              <a:t>12/28/16</a:t>
             </a:fld>
             <a:endParaRPr lang="en-US" dirty="0"/>
           </a:p>
@@ -3771,7 +3771,7 @@
           <a:p>
             <a:r>
               <a:rPr lang="en-US" dirty="0" smtClean="0"/>
-              <a:t>${MAIN_TITLE}</a:t>
+              <a:t>Demonstration </a:t>
             </a:r>
             <a:endParaRPr lang="en-US" dirty="0"/>
           </a:p>
@@ -3793,8 +3793,20 @@
           <a:lstStyle/>
           <a:p>
             <a:r>
-              <a:rPr lang="en-US" smtClean="0"/>
-              <a:t>${SUB_TITLE}</a:t>
+              <a:rPr lang="en-US" dirty="0" smtClean="0"/>
+              <a:t>Inserting </a:t>
+            </a:r>
+            <a:r>
+              <a:rPr lang="en-US" dirty="0" err="1" smtClean="0"/>
+              <a:t>svg</a:t>
+            </a:r>
+            <a:r>
+              <a:rPr lang="en-US" dirty="0" smtClean="0"/>
+              <a:t> graphs into </a:t>
+            </a:r>
+            <a:r>
+              <a:rPr lang="en-US" smtClean="0"/>
+              <a:t>Powerpoint</a:t>
             </a:r>
             <a:endParaRPr lang="en-US" dirty="0"/>
           </a:p>

</xml_diff>